<commit_message>
Transport (Trad and Orange)
plus presentation
</commit_message>
<xml_diff>
--- a/Presentations/Next Steps.pptx
+++ b/Presentations/Next Steps.pptx
@@ -13,8 +13,9 @@
     <p:sldId id="261" r:id="rId7"/>
     <p:sldId id="262" r:id="rId8"/>
     <p:sldId id="267" r:id="rId9"/>
-    <p:sldId id="263" r:id="rId10"/>
-    <p:sldId id="264" r:id="rId11"/>
+    <p:sldId id="268" r:id="rId10"/>
+    <p:sldId id="263" r:id="rId11"/>
+    <p:sldId id="264" r:id="rId12"/>
   </p:sldIdLst>
   <p:sldSz cx="9144000" cy="6858000" type="screen4x3"/>
   <p:notesSz cx="6858000" cy="9144000"/>
@@ -297,7 +298,7 @@
           <a:p>
             <a:fld id="{665A35BC-F222-5341-90C8-7BB1FB3E332D}" type="datetimeFigureOut">
               <a:rPr lang="en-US" smtClean="0"/>
-              <a:t>11/25/13</a:t>
+              <a:t>12/2/13</a:t>
             </a:fld>
             <a:endParaRPr lang="en-US"/>
           </a:p>
@@ -467,7 +468,7 @@
           <a:p>
             <a:fld id="{665A35BC-F222-5341-90C8-7BB1FB3E332D}" type="datetimeFigureOut">
               <a:rPr lang="en-US" smtClean="0"/>
-              <a:t>11/25/13</a:t>
+              <a:t>12/2/13</a:t>
             </a:fld>
             <a:endParaRPr lang="en-US"/>
           </a:p>
@@ -647,7 +648,7 @@
           <a:p>
             <a:fld id="{665A35BC-F222-5341-90C8-7BB1FB3E332D}" type="datetimeFigureOut">
               <a:rPr lang="en-US" smtClean="0"/>
-              <a:t>11/25/13</a:t>
+              <a:t>12/2/13</a:t>
             </a:fld>
             <a:endParaRPr lang="en-US"/>
           </a:p>
@@ -817,7 +818,7 @@
           <a:p>
             <a:fld id="{665A35BC-F222-5341-90C8-7BB1FB3E332D}" type="datetimeFigureOut">
               <a:rPr lang="en-US" smtClean="0"/>
-              <a:t>11/25/13</a:t>
+              <a:t>12/2/13</a:t>
             </a:fld>
             <a:endParaRPr lang="en-US"/>
           </a:p>
@@ -1063,7 +1064,7 @@
           <a:p>
             <a:fld id="{665A35BC-F222-5341-90C8-7BB1FB3E332D}" type="datetimeFigureOut">
               <a:rPr lang="en-US" smtClean="0"/>
-              <a:t>11/25/13</a:t>
+              <a:t>12/2/13</a:t>
             </a:fld>
             <a:endParaRPr lang="en-US"/>
           </a:p>
@@ -1351,7 +1352,7 @@
           <a:p>
             <a:fld id="{665A35BC-F222-5341-90C8-7BB1FB3E332D}" type="datetimeFigureOut">
               <a:rPr lang="en-US" smtClean="0"/>
-              <a:t>11/25/13</a:t>
+              <a:t>12/2/13</a:t>
             </a:fld>
             <a:endParaRPr lang="en-US"/>
           </a:p>
@@ -1773,7 +1774,7 @@
           <a:p>
             <a:fld id="{665A35BC-F222-5341-90C8-7BB1FB3E332D}" type="datetimeFigureOut">
               <a:rPr lang="en-US" smtClean="0"/>
-              <a:t>11/25/13</a:t>
+              <a:t>12/2/13</a:t>
             </a:fld>
             <a:endParaRPr lang="en-US"/>
           </a:p>
@@ -1891,7 +1892,7 @@
           <a:p>
             <a:fld id="{665A35BC-F222-5341-90C8-7BB1FB3E332D}" type="datetimeFigureOut">
               <a:rPr lang="en-US" smtClean="0"/>
-              <a:t>11/25/13</a:t>
+              <a:t>12/2/13</a:t>
             </a:fld>
             <a:endParaRPr lang="en-US"/>
           </a:p>
@@ -1986,7 +1987,7 @@
           <a:p>
             <a:fld id="{665A35BC-F222-5341-90C8-7BB1FB3E332D}" type="datetimeFigureOut">
               <a:rPr lang="en-US" smtClean="0"/>
-              <a:t>11/25/13</a:t>
+              <a:t>12/2/13</a:t>
             </a:fld>
             <a:endParaRPr lang="en-US"/>
           </a:p>
@@ -2263,7 +2264,7 @@
           <a:p>
             <a:fld id="{665A35BC-F222-5341-90C8-7BB1FB3E332D}" type="datetimeFigureOut">
               <a:rPr lang="en-US" smtClean="0"/>
-              <a:t>11/25/13</a:t>
+              <a:t>12/2/13</a:t>
             </a:fld>
             <a:endParaRPr lang="en-US"/>
           </a:p>
@@ -2516,7 +2517,7 @@
           <a:p>
             <a:fld id="{665A35BC-F222-5341-90C8-7BB1FB3E332D}" type="datetimeFigureOut">
               <a:rPr lang="en-US" smtClean="0"/>
-              <a:t>11/25/13</a:t>
+              <a:t>12/2/13</a:t>
             </a:fld>
             <a:endParaRPr lang="en-US"/>
           </a:p>
@@ -2729,7 +2730,7 @@
           <a:p>
             <a:fld id="{665A35BC-F222-5341-90C8-7BB1FB3E332D}" type="datetimeFigureOut">
               <a:rPr lang="en-US" smtClean="0"/>
-              <a:t>11/25/13</a:t>
+              <a:t>12/2/13</a:t>
             </a:fld>
             <a:endParaRPr lang="en-US"/>
           </a:p>
@@ -3190,6 +3191,697 @@
 </file>
 
 <file path=ppt/slides/slide10.xml><?xml version="1.0" encoding="utf-8"?>
+<p:sld xmlns:a="http://schemas.openxmlformats.org/drawingml/2006/main" xmlns:r="http://schemas.openxmlformats.org/officeDocument/2006/relationships" xmlns:p="http://schemas.openxmlformats.org/presentationml/2006/main">
+  <p:cSld>
+    <p:spTree>
+      <p:nvGrpSpPr>
+        <p:cNvPr id="1" name=""/>
+        <p:cNvGrpSpPr/>
+        <p:nvPr/>
+      </p:nvGrpSpPr>
+      <p:grpSpPr>
+        <a:xfrm>
+          <a:off x="0" y="0"/>
+          <a:ext cx="0" cy="0"/>
+          <a:chOff x="0" y="0"/>
+          <a:chExt cx="0" cy="0"/>
+        </a:xfrm>
+      </p:grpSpPr>
+      <p:sp>
+        <p:nvSpPr>
+          <p:cNvPr id="3" name="Rounded Rectangle 2"/>
+          <p:cNvSpPr/>
+          <p:nvPr/>
+        </p:nvSpPr>
+        <p:spPr>
+          <a:xfrm>
+            <a:off x="593793" y="280424"/>
+            <a:ext cx="7900746" cy="6251790"/>
+          </a:xfrm>
+          <a:prstGeom prst="roundRect">
+            <a:avLst/>
+          </a:prstGeom>
+        </p:spPr>
+        <p:style>
+          <a:lnRef idx="1">
+            <a:schemeClr val="accent6"/>
+          </a:lnRef>
+          <a:fillRef idx="3">
+            <a:schemeClr val="accent6"/>
+          </a:fillRef>
+          <a:effectRef idx="2">
+            <a:schemeClr val="accent6"/>
+          </a:effectRef>
+          <a:fontRef idx="minor">
+            <a:schemeClr val="lt1"/>
+          </a:fontRef>
+        </p:style>
+        <p:txBody>
+          <a:bodyPr rtlCol="0" anchor="ctr"/>
+          <a:lstStyle/>
+          <a:p>
+            <a:pPr algn="ctr"/>
+            <a:endParaRPr lang="en-US" sz="3200" dirty="0"/>
+          </a:p>
+        </p:txBody>
+      </p:sp>
+      <p:sp>
+        <p:nvSpPr>
+          <p:cNvPr id="4" name="Rounded Rectangle 3"/>
+          <p:cNvSpPr/>
+          <p:nvPr/>
+        </p:nvSpPr>
+        <p:spPr>
+          <a:xfrm>
+            <a:off x="1138103" y="956731"/>
+            <a:ext cx="3315345" cy="2540306"/>
+          </a:xfrm>
+          <a:prstGeom prst="roundRect">
+            <a:avLst/>
+          </a:prstGeom>
+        </p:spPr>
+        <p:style>
+          <a:lnRef idx="1">
+            <a:schemeClr val="accent3"/>
+          </a:lnRef>
+          <a:fillRef idx="3">
+            <a:schemeClr val="accent3"/>
+          </a:fillRef>
+          <a:effectRef idx="2">
+            <a:schemeClr val="accent3"/>
+          </a:effectRef>
+          <a:fontRef idx="minor">
+            <a:schemeClr val="lt1"/>
+          </a:fontRef>
+        </p:style>
+        <p:txBody>
+          <a:bodyPr rtlCol="0" anchor="ctr"/>
+          <a:lstStyle/>
+          <a:p>
+            <a:pPr algn="ctr"/>
+            <a:r>
+              <a:rPr lang="en-US" sz="3200" b="1" dirty="0" smtClean="0"/>
+              <a:t>Orange Protocol</a:t>
+            </a:r>
+            <a:endParaRPr lang="en-US" sz="3200" b="1" dirty="0"/>
+          </a:p>
+        </p:txBody>
+      </p:sp>
+      <p:sp>
+        <p:nvSpPr>
+          <p:cNvPr id="5" name="Rounded Rectangle 4"/>
+          <p:cNvSpPr/>
+          <p:nvPr/>
+        </p:nvSpPr>
+        <p:spPr>
+          <a:xfrm>
+            <a:off x="1138103" y="3661987"/>
+            <a:ext cx="3315345" cy="2540306"/>
+          </a:xfrm>
+          <a:prstGeom prst="roundRect">
+            <a:avLst/>
+          </a:prstGeom>
+        </p:spPr>
+        <p:style>
+          <a:lnRef idx="1">
+            <a:schemeClr val="accent3"/>
+          </a:lnRef>
+          <a:fillRef idx="3">
+            <a:schemeClr val="accent3"/>
+          </a:fillRef>
+          <a:effectRef idx="2">
+            <a:schemeClr val="accent3"/>
+          </a:effectRef>
+          <a:fontRef idx="minor">
+            <a:schemeClr val="lt1"/>
+          </a:fontRef>
+        </p:style>
+        <p:txBody>
+          <a:bodyPr rtlCol="0" anchor="ctr"/>
+          <a:lstStyle/>
+          <a:p>
+            <a:pPr algn="ctr"/>
+            <a:r>
+              <a:rPr lang="en-US" sz="3200" b="1" dirty="0" smtClean="0"/>
+              <a:t>Orange Observer</a:t>
+            </a:r>
+            <a:endParaRPr lang="en-US" sz="3200" b="1" dirty="0"/>
+          </a:p>
+        </p:txBody>
+      </p:sp>
+      <p:graphicFrame>
+        <p:nvGraphicFramePr>
+          <p:cNvPr id="9" name="Table 8"/>
+          <p:cNvGraphicFramePr>
+            <a:graphicFrameLocks noGrp="1"/>
+          </p:cNvGraphicFramePr>
+          <p:nvPr>
+            <p:extLst>
+              <p:ext uri="{D42A27DB-BD31-4B8C-83A1-F6EECF244321}">
+                <p14:modId xmlns:p14="http://schemas.microsoft.com/office/powerpoint/2010/main" val="2076118084"/>
+              </p:ext>
+            </p:extLst>
+          </p:nvPr>
+        </p:nvGraphicFramePr>
+        <p:xfrm>
+          <a:off x="5562513" y="956731"/>
+          <a:ext cx="2045287" cy="5069224"/>
+        </p:xfrm>
+        <a:graphic>
+          <a:graphicData uri="http://schemas.openxmlformats.org/drawingml/2006/table">
+            <a:tbl>
+              <a:tblPr firstRow="1" bandRow="1">
+                <a:tableStyleId>{22838BEF-8BB2-4498-84A7-C5851F593DF1}</a:tableStyleId>
+              </a:tblPr>
+              <a:tblGrid>
+                <a:gridCol w="2045287"/>
+              </a:tblGrid>
+              <a:tr h="633653">
+                <a:tc>
+                  <a:txBody>
+                    <a:bodyPr/>
+                    <a:lstStyle/>
+                    <a:p>
+                      <a:endParaRPr lang="en-US" dirty="0"/>
+                    </a:p>
+                  </a:txBody>
+                  <a:tcPr/>
+                </a:tc>
+              </a:tr>
+              <a:tr h="633653">
+                <a:tc>
+                  <a:txBody>
+                    <a:bodyPr/>
+                    <a:lstStyle/>
+                    <a:p>
+                      <a:endParaRPr lang="en-US" dirty="0"/>
+                    </a:p>
+                  </a:txBody>
+                  <a:tcPr/>
+                </a:tc>
+              </a:tr>
+              <a:tr h="633653">
+                <a:tc>
+                  <a:txBody>
+                    <a:bodyPr/>
+                    <a:lstStyle/>
+                    <a:p>
+                      <a:endParaRPr lang="en-US" dirty="0"/>
+                    </a:p>
+                  </a:txBody>
+                  <a:tcPr/>
+                </a:tc>
+              </a:tr>
+              <a:tr h="633653">
+                <a:tc>
+                  <a:txBody>
+                    <a:bodyPr/>
+                    <a:lstStyle/>
+                    <a:p>
+                      <a:endParaRPr lang="en-US"/>
+                    </a:p>
+                  </a:txBody>
+                  <a:tcPr/>
+                </a:tc>
+              </a:tr>
+              <a:tr h="633653">
+                <a:tc>
+                  <a:txBody>
+                    <a:bodyPr/>
+                    <a:lstStyle/>
+                    <a:p>
+                      <a:endParaRPr lang="en-US" dirty="0"/>
+                    </a:p>
+                  </a:txBody>
+                  <a:tcPr/>
+                </a:tc>
+              </a:tr>
+              <a:tr h="633653">
+                <a:tc>
+                  <a:txBody>
+                    <a:bodyPr/>
+                    <a:lstStyle/>
+                    <a:p>
+                      <a:endParaRPr lang="en-US"/>
+                    </a:p>
+                  </a:txBody>
+                  <a:tcPr/>
+                </a:tc>
+              </a:tr>
+              <a:tr h="633653">
+                <a:tc>
+                  <a:txBody>
+                    <a:bodyPr/>
+                    <a:lstStyle/>
+                    <a:p>
+                      <a:endParaRPr lang="en-US" dirty="0"/>
+                    </a:p>
+                  </a:txBody>
+                  <a:tcPr/>
+                </a:tc>
+              </a:tr>
+              <a:tr h="633653">
+                <a:tc>
+                  <a:txBody>
+                    <a:bodyPr/>
+                    <a:lstStyle/>
+                    <a:p>
+                      <a:endParaRPr lang="en-US" dirty="0"/>
+                    </a:p>
+                  </a:txBody>
+                  <a:tcPr/>
+                </a:tc>
+              </a:tr>
+            </a:tbl>
+          </a:graphicData>
+        </a:graphic>
+      </p:graphicFrame>
+      <p:sp>
+        <p:nvSpPr>
+          <p:cNvPr id="7" name="Rectangle 6"/>
+          <p:cNvSpPr/>
+          <p:nvPr/>
+        </p:nvSpPr>
+        <p:spPr>
+          <a:xfrm>
+            <a:off x="5937931" y="1034073"/>
+            <a:ext cx="1319116" cy="494872"/>
+          </a:xfrm>
+          <a:prstGeom prst="rect">
+            <a:avLst/>
+          </a:prstGeom>
+        </p:spPr>
+        <p:style>
+          <a:lnRef idx="3">
+            <a:schemeClr val="lt1"/>
+          </a:lnRef>
+          <a:fillRef idx="1">
+            <a:schemeClr val="accent3"/>
+          </a:fillRef>
+          <a:effectRef idx="1">
+            <a:schemeClr val="accent3"/>
+          </a:effectRef>
+          <a:fontRef idx="minor">
+            <a:schemeClr val="lt1"/>
+          </a:fontRef>
+        </p:style>
+        <p:txBody>
+          <a:bodyPr rtlCol="0" anchor="ctr"/>
+          <a:lstStyle/>
+          <a:p>
+            <a:pPr algn="ctr"/>
+            <a:r>
+              <a:rPr lang="en-US" dirty="0" smtClean="0"/>
+              <a:t>Message 1</a:t>
+            </a:r>
+            <a:endParaRPr lang="en-US" dirty="0"/>
+          </a:p>
+        </p:txBody>
+      </p:sp>
+      <p:sp>
+        <p:nvSpPr>
+          <p:cNvPr id="12" name="Rectangle 11"/>
+          <p:cNvSpPr/>
+          <p:nvPr/>
+        </p:nvSpPr>
+        <p:spPr>
+          <a:xfrm>
+            <a:off x="5937931" y="1664135"/>
+            <a:ext cx="1319116" cy="494872"/>
+          </a:xfrm>
+          <a:prstGeom prst="rect">
+            <a:avLst/>
+          </a:prstGeom>
+        </p:spPr>
+        <p:style>
+          <a:lnRef idx="3">
+            <a:schemeClr val="lt1"/>
+          </a:lnRef>
+          <a:fillRef idx="1">
+            <a:schemeClr val="accent3"/>
+          </a:fillRef>
+          <a:effectRef idx="1">
+            <a:schemeClr val="accent3"/>
+          </a:effectRef>
+          <a:fontRef idx="minor">
+            <a:schemeClr val="lt1"/>
+          </a:fontRef>
+        </p:style>
+        <p:txBody>
+          <a:bodyPr rtlCol="0" anchor="ctr"/>
+          <a:lstStyle/>
+          <a:p>
+            <a:pPr algn="ctr"/>
+            <a:r>
+              <a:rPr lang="en-US" dirty="0" smtClean="0"/>
+              <a:t>Message 2</a:t>
+            </a:r>
+            <a:endParaRPr lang="en-US" dirty="0"/>
+          </a:p>
+        </p:txBody>
+      </p:sp>
+      <p:sp>
+        <p:nvSpPr>
+          <p:cNvPr id="13" name="Rectangle 12"/>
+          <p:cNvSpPr/>
+          <p:nvPr/>
+        </p:nvSpPr>
+        <p:spPr>
+          <a:xfrm>
+            <a:off x="5937931" y="2297639"/>
+            <a:ext cx="1319116" cy="494872"/>
+          </a:xfrm>
+          <a:prstGeom prst="rect">
+            <a:avLst/>
+          </a:prstGeom>
+        </p:spPr>
+        <p:style>
+          <a:lnRef idx="3">
+            <a:schemeClr val="lt1"/>
+          </a:lnRef>
+          <a:fillRef idx="1">
+            <a:schemeClr val="accent3"/>
+          </a:fillRef>
+          <a:effectRef idx="1">
+            <a:schemeClr val="accent3"/>
+          </a:effectRef>
+          <a:fontRef idx="minor">
+            <a:schemeClr val="lt1"/>
+          </a:fontRef>
+        </p:style>
+        <p:txBody>
+          <a:bodyPr rtlCol="0" anchor="ctr"/>
+          <a:lstStyle/>
+          <a:p>
+            <a:pPr algn="ctr"/>
+            <a:r>
+              <a:rPr lang="en-US" dirty="0" smtClean="0"/>
+              <a:t>Message 3</a:t>
+            </a:r>
+            <a:endParaRPr lang="en-US" dirty="0"/>
+          </a:p>
+        </p:txBody>
+      </p:sp>
+      <p:sp>
+        <p:nvSpPr>
+          <p:cNvPr id="14" name="Rectangle 13"/>
+          <p:cNvSpPr/>
+          <p:nvPr/>
+        </p:nvSpPr>
+        <p:spPr>
+          <a:xfrm>
+            <a:off x="5937931" y="2920819"/>
+            <a:ext cx="1319116" cy="494872"/>
+          </a:xfrm>
+          <a:prstGeom prst="rect">
+            <a:avLst/>
+          </a:prstGeom>
+        </p:spPr>
+        <p:style>
+          <a:lnRef idx="3">
+            <a:schemeClr val="lt1"/>
+          </a:lnRef>
+          <a:fillRef idx="1">
+            <a:schemeClr val="accent3"/>
+          </a:fillRef>
+          <a:effectRef idx="1">
+            <a:schemeClr val="accent3"/>
+          </a:effectRef>
+          <a:fontRef idx="minor">
+            <a:schemeClr val="lt1"/>
+          </a:fontRef>
+        </p:style>
+        <p:txBody>
+          <a:bodyPr rtlCol="0" anchor="ctr"/>
+          <a:lstStyle/>
+          <a:p>
+            <a:pPr algn="ctr"/>
+            <a:r>
+              <a:rPr lang="en-US" dirty="0" smtClean="0"/>
+              <a:t>Message 4</a:t>
+            </a:r>
+            <a:endParaRPr lang="en-US" dirty="0"/>
+          </a:p>
+        </p:txBody>
+      </p:sp>
+      <p:sp>
+        <p:nvSpPr>
+          <p:cNvPr id="15" name="Rectangle 14"/>
+          <p:cNvSpPr/>
+          <p:nvPr/>
+        </p:nvSpPr>
+        <p:spPr>
+          <a:xfrm>
+            <a:off x="5937931" y="3555792"/>
+            <a:ext cx="1319116" cy="494872"/>
+          </a:xfrm>
+          <a:prstGeom prst="rect">
+            <a:avLst/>
+          </a:prstGeom>
+        </p:spPr>
+        <p:style>
+          <a:lnRef idx="3">
+            <a:schemeClr val="lt1"/>
+          </a:lnRef>
+          <a:fillRef idx="1">
+            <a:schemeClr val="accent3"/>
+          </a:fillRef>
+          <a:effectRef idx="1">
+            <a:schemeClr val="accent3"/>
+          </a:effectRef>
+          <a:fontRef idx="minor">
+            <a:schemeClr val="lt1"/>
+          </a:fontRef>
+        </p:style>
+        <p:txBody>
+          <a:bodyPr rtlCol="0" anchor="ctr"/>
+          <a:lstStyle/>
+          <a:p>
+            <a:pPr algn="ctr"/>
+            <a:r>
+              <a:rPr lang="en-US" dirty="0" smtClean="0"/>
+              <a:t>Message 5</a:t>
+            </a:r>
+            <a:endParaRPr lang="en-US" dirty="0"/>
+          </a:p>
+        </p:txBody>
+      </p:sp>
+      <p:sp>
+        <p:nvSpPr>
+          <p:cNvPr id="16" name="Rectangle 15"/>
+          <p:cNvSpPr/>
+          <p:nvPr/>
+        </p:nvSpPr>
+        <p:spPr>
+          <a:xfrm>
+            <a:off x="5937931" y="4189296"/>
+            <a:ext cx="1319116" cy="494872"/>
+          </a:xfrm>
+          <a:prstGeom prst="rect">
+            <a:avLst/>
+          </a:prstGeom>
+        </p:spPr>
+        <p:style>
+          <a:lnRef idx="3">
+            <a:schemeClr val="lt1"/>
+          </a:lnRef>
+          <a:fillRef idx="1">
+            <a:schemeClr val="accent3"/>
+          </a:fillRef>
+          <a:effectRef idx="1">
+            <a:schemeClr val="accent3"/>
+          </a:effectRef>
+          <a:fontRef idx="minor">
+            <a:schemeClr val="lt1"/>
+          </a:fontRef>
+        </p:style>
+        <p:txBody>
+          <a:bodyPr rtlCol="0" anchor="ctr"/>
+          <a:lstStyle/>
+          <a:p>
+            <a:pPr algn="ctr"/>
+            <a:r>
+              <a:rPr lang="en-US" dirty="0" smtClean="0"/>
+              <a:t>Message 6</a:t>
+            </a:r>
+            <a:endParaRPr lang="en-US" dirty="0"/>
+          </a:p>
+        </p:txBody>
+      </p:sp>
+      <p:sp>
+        <p:nvSpPr>
+          <p:cNvPr id="17" name="Rectangle 16"/>
+          <p:cNvSpPr/>
+          <p:nvPr/>
+        </p:nvSpPr>
+        <p:spPr>
+          <a:xfrm>
+            <a:off x="5937931" y="4805593"/>
+            <a:ext cx="1319116" cy="494872"/>
+          </a:xfrm>
+          <a:prstGeom prst="rect">
+            <a:avLst/>
+          </a:prstGeom>
+        </p:spPr>
+        <p:style>
+          <a:lnRef idx="3">
+            <a:schemeClr val="lt1"/>
+          </a:lnRef>
+          <a:fillRef idx="1">
+            <a:schemeClr val="accent3"/>
+          </a:fillRef>
+          <a:effectRef idx="1">
+            <a:schemeClr val="accent3"/>
+          </a:effectRef>
+          <a:fontRef idx="minor">
+            <a:schemeClr val="lt1"/>
+          </a:fontRef>
+        </p:style>
+        <p:txBody>
+          <a:bodyPr rtlCol="0" anchor="ctr"/>
+          <a:lstStyle/>
+          <a:p>
+            <a:pPr algn="ctr"/>
+            <a:r>
+              <a:rPr lang="en-US" dirty="0" smtClean="0"/>
+              <a:t>Message 7</a:t>
+            </a:r>
+            <a:endParaRPr lang="en-US" dirty="0"/>
+          </a:p>
+        </p:txBody>
+      </p:sp>
+      <p:sp>
+        <p:nvSpPr>
+          <p:cNvPr id="18" name="Rectangle 17"/>
+          <p:cNvSpPr/>
+          <p:nvPr/>
+        </p:nvSpPr>
+        <p:spPr>
+          <a:xfrm>
+            <a:off x="5937931" y="5452865"/>
+            <a:ext cx="1319116" cy="494872"/>
+          </a:xfrm>
+          <a:prstGeom prst="rect">
+            <a:avLst/>
+          </a:prstGeom>
+        </p:spPr>
+        <p:style>
+          <a:lnRef idx="3">
+            <a:schemeClr val="lt1"/>
+          </a:lnRef>
+          <a:fillRef idx="1">
+            <a:schemeClr val="accent3"/>
+          </a:fillRef>
+          <a:effectRef idx="1">
+            <a:schemeClr val="accent3"/>
+          </a:effectRef>
+          <a:fontRef idx="minor">
+            <a:schemeClr val="lt1"/>
+          </a:fontRef>
+        </p:style>
+        <p:txBody>
+          <a:bodyPr rtlCol="0" anchor="ctr"/>
+          <a:lstStyle/>
+          <a:p>
+            <a:pPr algn="ctr"/>
+            <a:r>
+              <a:rPr lang="en-US" dirty="0" smtClean="0"/>
+              <a:t>Message 8</a:t>
+            </a:r>
+            <a:endParaRPr lang="en-US" dirty="0"/>
+          </a:p>
+        </p:txBody>
+      </p:sp>
+      <p:cxnSp>
+        <p:nvCxnSpPr>
+          <p:cNvPr id="19" name="Straight Arrow Connector 18"/>
+          <p:cNvCxnSpPr/>
+          <p:nvPr/>
+        </p:nvCxnSpPr>
+        <p:spPr>
+          <a:xfrm>
+            <a:off x="4453448" y="1554532"/>
+            <a:ext cx="1109065" cy="0"/>
+          </a:xfrm>
+          <a:prstGeom prst="straightConnector1">
+            <a:avLst/>
+          </a:prstGeom>
+          <a:ln w="76200" cmpd="sng">
+            <a:tailEnd type="arrow"/>
+          </a:ln>
+        </p:spPr>
+        <p:style>
+          <a:lnRef idx="2">
+            <a:schemeClr val="dk1"/>
+          </a:lnRef>
+          <a:fillRef idx="0">
+            <a:schemeClr val="dk1"/>
+          </a:fillRef>
+          <a:effectRef idx="1">
+            <a:schemeClr val="dk1"/>
+          </a:effectRef>
+          <a:fontRef idx="minor">
+            <a:schemeClr val="tx1"/>
+          </a:fontRef>
+        </p:style>
+      </p:cxnSp>
+      <p:cxnSp>
+        <p:nvCxnSpPr>
+          <p:cNvPr id="10" name="Curved Connector 9"/>
+          <p:cNvCxnSpPr>
+            <a:stCxn id="9" idx="0"/>
+          </p:cNvCxnSpPr>
+          <p:nvPr/>
+        </p:nvCxnSpPr>
+        <p:spPr>
+          <a:xfrm rot="5400000" flipH="1" flipV="1">
+            <a:off x="7201694" y="-336113"/>
+            <a:ext cx="676306" cy="1909383"/>
+          </a:xfrm>
+          <a:prstGeom prst="curvedConnector2">
+            <a:avLst/>
+          </a:prstGeom>
+          <a:ln w="76200" cmpd="sng">
+            <a:prstDash val="sysDash"/>
+            <a:tailEnd type="arrow"/>
+          </a:ln>
+        </p:spPr>
+        <p:style>
+          <a:lnRef idx="2">
+            <a:schemeClr val="accent1"/>
+          </a:lnRef>
+          <a:fillRef idx="0">
+            <a:schemeClr val="accent1"/>
+          </a:fillRef>
+          <a:effectRef idx="1">
+            <a:schemeClr val="accent1"/>
+          </a:effectRef>
+          <a:fontRef idx="minor">
+            <a:schemeClr val="tx1"/>
+          </a:fontRef>
+        </p:style>
+      </p:cxnSp>
+    </p:spTree>
+    <p:extLst>
+      <p:ext uri="{BB962C8B-B14F-4D97-AF65-F5344CB8AC3E}">
+        <p14:creationId xmlns:p14="http://schemas.microsoft.com/office/powerpoint/2010/main" val="1698869711"/>
+      </p:ext>
+    </p:extLst>
+  </p:cSld>
+  <p:clrMapOvr>
+    <a:masterClrMapping/>
+  </p:clrMapOvr>
+  <p:timing>
+    <p:tnLst>
+      <p:par>
+        <p:cTn xmlns:p14="http://schemas.microsoft.com/office/powerpoint/2010/main" id="1" dur="indefinite" restart="never" nodeType="tmRoot"/>
+      </p:par>
+    </p:tnLst>
+  </p:timing>
+</p:sld>
+</file>
+
+<file path=ppt/slides/slide11.xml><?xml version="1.0" encoding="utf-8"?>
 <p:sld xmlns:a="http://schemas.openxmlformats.org/drawingml/2006/main" xmlns:r="http://schemas.openxmlformats.org/officeDocument/2006/relationships" xmlns:p="http://schemas.openxmlformats.org/presentationml/2006/main">
   <p:cSld>
     <p:spTree>
@@ -7713,232 +8405,14 @@
       </p:sp>
       <p:sp>
         <p:nvSpPr>
-          <p:cNvPr id="20" name="Rectangle 19"/>
-          <p:cNvSpPr/>
-          <p:nvPr/>
-        </p:nvSpPr>
-        <p:spPr>
-          <a:xfrm>
-            <a:off x="4279769" y="2266325"/>
-            <a:ext cx="4529818" cy="494872"/>
-          </a:xfrm>
-          <a:prstGeom prst="rect">
-            <a:avLst/>
-          </a:prstGeom>
-        </p:spPr>
-        <p:style>
-          <a:lnRef idx="3">
-            <a:schemeClr val="lt1"/>
-          </a:lnRef>
-          <a:fillRef idx="1">
-            <a:schemeClr val="accent3"/>
-          </a:fillRef>
-          <a:effectRef idx="1">
-            <a:schemeClr val="accent3"/>
-          </a:effectRef>
-          <a:fontRef idx="minor">
-            <a:schemeClr val="lt1"/>
-          </a:fontRef>
-        </p:style>
-        <p:txBody>
-          <a:bodyPr rtlCol="0" anchor="ctr"/>
-          <a:lstStyle/>
-          <a:p>
-            <a:pPr algn="ctr"/>
-            <a:endParaRPr lang="en-US" dirty="0"/>
-          </a:p>
-        </p:txBody>
-      </p:sp>
-      <p:cxnSp>
-        <p:nvCxnSpPr>
-          <p:cNvPr id="10" name="Straight Connector 9"/>
-          <p:cNvCxnSpPr/>
-          <p:nvPr/>
-        </p:nvCxnSpPr>
-        <p:spPr>
-          <a:xfrm>
-            <a:off x="4945257" y="2266325"/>
-            <a:ext cx="0" cy="494872"/>
-          </a:xfrm>
-          <a:prstGeom prst="line">
-            <a:avLst/>
-          </a:prstGeom>
-        </p:spPr>
-        <p:style>
-          <a:lnRef idx="2">
-            <a:schemeClr val="accent3"/>
-          </a:lnRef>
-          <a:fillRef idx="0">
-            <a:schemeClr val="accent3"/>
-          </a:fillRef>
-          <a:effectRef idx="1">
-            <a:schemeClr val="accent3"/>
-          </a:effectRef>
-          <a:fontRef idx="minor">
-            <a:schemeClr val="tx1"/>
-          </a:fontRef>
-        </p:style>
-      </p:cxnSp>
-      <p:cxnSp>
-        <p:nvCxnSpPr>
-          <p:cNvPr id="19" name="Straight Connector 18"/>
-          <p:cNvCxnSpPr/>
-          <p:nvPr/>
-        </p:nvCxnSpPr>
-        <p:spPr>
-          <a:xfrm>
-            <a:off x="5614872" y="2266325"/>
-            <a:ext cx="0" cy="494872"/>
-          </a:xfrm>
-          <a:prstGeom prst="line">
-            <a:avLst/>
-          </a:prstGeom>
-        </p:spPr>
-        <p:style>
-          <a:lnRef idx="2">
-            <a:schemeClr val="accent3"/>
-          </a:lnRef>
-          <a:fillRef idx="0">
-            <a:schemeClr val="accent3"/>
-          </a:fillRef>
-          <a:effectRef idx="1">
-            <a:schemeClr val="accent3"/>
-          </a:effectRef>
-          <a:fontRef idx="minor">
-            <a:schemeClr val="tx1"/>
-          </a:fontRef>
-        </p:style>
-      </p:cxnSp>
-      <p:cxnSp>
-        <p:nvCxnSpPr>
-          <p:cNvPr id="21" name="Straight Connector 20"/>
-          <p:cNvCxnSpPr/>
-          <p:nvPr/>
-        </p:nvCxnSpPr>
-        <p:spPr>
-          <a:xfrm>
-            <a:off x="6270978" y="2266325"/>
-            <a:ext cx="0" cy="494872"/>
-          </a:xfrm>
-          <a:prstGeom prst="line">
-            <a:avLst/>
-          </a:prstGeom>
-        </p:spPr>
-        <p:style>
-          <a:lnRef idx="2">
-            <a:schemeClr val="accent3"/>
-          </a:lnRef>
-          <a:fillRef idx="0">
-            <a:schemeClr val="accent3"/>
-          </a:fillRef>
-          <a:effectRef idx="1">
-            <a:schemeClr val="accent3"/>
-          </a:effectRef>
-          <a:fontRef idx="minor">
-            <a:schemeClr val="tx1"/>
-          </a:fontRef>
-        </p:style>
-      </p:cxnSp>
-      <p:cxnSp>
-        <p:nvCxnSpPr>
-          <p:cNvPr id="22" name="Straight Connector 21"/>
-          <p:cNvCxnSpPr/>
-          <p:nvPr/>
-        </p:nvCxnSpPr>
-        <p:spPr>
-          <a:xfrm>
-            <a:off x="6882777" y="2266325"/>
-            <a:ext cx="0" cy="494872"/>
-          </a:xfrm>
-          <a:prstGeom prst="line">
-            <a:avLst/>
-          </a:prstGeom>
-        </p:spPr>
-        <p:style>
-          <a:lnRef idx="2">
-            <a:schemeClr val="accent3"/>
-          </a:lnRef>
-          <a:fillRef idx="0">
-            <a:schemeClr val="accent3"/>
-          </a:fillRef>
-          <a:effectRef idx="1">
-            <a:schemeClr val="accent3"/>
-          </a:effectRef>
-          <a:fontRef idx="minor">
-            <a:schemeClr val="tx1"/>
-          </a:fontRef>
-        </p:style>
-      </p:cxnSp>
-      <p:cxnSp>
-        <p:nvCxnSpPr>
-          <p:cNvPr id="23" name="Straight Connector 22"/>
-          <p:cNvCxnSpPr/>
-          <p:nvPr/>
-        </p:nvCxnSpPr>
-        <p:spPr>
-          <a:xfrm>
-            <a:off x="7481063" y="2266325"/>
-            <a:ext cx="0" cy="494872"/>
-          </a:xfrm>
-          <a:prstGeom prst="line">
-            <a:avLst/>
-          </a:prstGeom>
-        </p:spPr>
-        <p:style>
-          <a:lnRef idx="2">
-            <a:schemeClr val="accent3"/>
-          </a:lnRef>
-          <a:fillRef idx="0">
-            <a:schemeClr val="accent3"/>
-          </a:fillRef>
-          <a:effectRef idx="1">
-            <a:schemeClr val="accent3"/>
-          </a:effectRef>
-          <a:fontRef idx="minor">
-            <a:schemeClr val="tx1"/>
-          </a:fontRef>
-        </p:style>
-      </p:cxnSp>
-      <p:cxnSp>
-        <p:nvCxnSpPr>
-          <p:cNvPr id="24" name="Straight Connector 23"/>
-          <p:cNvCxnSpPr/>
-          <p:nvPr/>
-        </p:nvCxnSpPr>
-        <p:spPr>
-          <a:xfrm>
-            <a:off x="8119882" y="2256533"/>
-            <a:ext cx="0" cy="494872"/>
-          </a:xfrm>
-          <a:prstGeom prst="line">
-            <a:avLst/>
-          </a:prstGeom>
-        </p:spPr>
-        <p:style>
-          <a:lnRef idx="2">
-            <a:schemeClr val="accent3"/>
-          </a:lnRef>
-          <a:fillRef idx="0">
-            <a:schemeClr val="accent3"/>
-          </a:fillRef>
-          <a:effectRef idx="1">
-            <a:schemeClr val="accent3"/>
-          </a:effectRef>
-          <a:fontRef idx="minor">
-            <a:schemeClr val="tx1"/>
-          </a:fontRef>
-        </p:style>
-      </p:cxnSp>
-      <p:sp>
-        <p:nvSpPr>
-          <p:cNvPr id="2" name="TextBox 1"/>
+          <p:cNvPr id="34" name="TextBox 33"/>
           <p:cNvSpPr txBox="1"/>
           <p:nvPr/>
         </p:nvSpPr>
         <p:spPr>
           <a:xfrm>
-            <a:off x="4279769" y="2896387"/>
-            <a:ext cx="3968943" cy="369332"/>
+            <a:off x="4283537" y="1076487"/>
+            <a:ext cx="1000582" cy="369332"/>
           </a:xfrm>
           <a:prstGeom prst="rect">
             <a:avLst/>
@@ -7952,241 +8426,23 @@
           <a:lstStyle/>
           <a:p>
             <a:r>
-              <a:rPr lang="en-US" dirty="0" smtClean="0"/>
-              <a:t>| 128 kb | 128 kb | 128 kb | … | 128 kb|</a:t>
-            </a:r>
-            <a:endParaRPr lang="en-US" dirty="0"/>
-          </a:p>
-        </p:txBody>
-      </p:sp>
-      <p:sp>
-        <p:nvSpPr>
-          <p:cNvPr id="25" name="Rectangle 24"/>
-          <p:cNvSpPr/>
-          <p:nvPr/>
-        </p:nvSpPr>
-        <p:spPr>
-          <a:xfrm>
-            <a:off x="4283537" y="4269595"/>
-            <a:ext cx="4529818" cy="494872"/>
-          </a:xfrm>
-          <a:prstGeom prst="rect">
-            <a:avLst/>
-          </a:prstGeom>
-        </p:spPr>
-        <p:style>
-          <a:lnRef idx="3">
-            <a:schemeClr val="lt1"/>
-          </a:lnRef>
-          <a:fillRef idx="1">
-            <a:schemeClr val="accent3"/>
-          </a:fillRef>
-          <a:effectRef idx="1">
-            <a:schemeClr val="accent3"/>
-          </a:effectRef>
-          <a:fontRef idx="minor">
-            <a:schemeClr val="lt1"/>
-          </a:fontRef>
-        </p:style>
-        <p:txBody>
-          <a:bodyPr rtlCol="0" anchor="ctr"/>
-          <a:lstStyle/>
-          <a:p>
-            <a:pPr algn="ctr"/>
-            <a:endParaRPr lang="en-US" dirty="0"/>
-          </a:p>
-        </p:txBody>
-      </p:sp>
-      <p:cxnSp>
-        <p:nvCxnSpPr>
-          <p:cNvPr id="26" name="Straight Connector 25"/>
-          <p:cNvCxnSpPr/>
-          <p:nvPr/>
-        </p:nvCxnSpPr>
-        <p:spPr>
-          <a:xfrm>
-            <a:off x="4949025" y="4269595"/>
-            <a:ext cx="0" cy="494872"/>
-          </a:xfrm>
-          <a:prstGeom prst="line">
-            <a:avLst/>
-          </a:prstGeom>
-        </p:spPr>
-        <p:style>
-          <a:lnRef idx="2">
-            <a:schemeClr val="accent3"/>
-          </a:lnRef>
-          <a:fillRef idx="0">
-            <a:schemeClr val="accent3"/>
-          </a:fillRef>
-          <a:effectRef idx="1">
-            <a:schemeClr val="accent3"/>
-          </a:effectRef>
-          <a:fontRef idx="minor">
-            <a:schemeClr val="tx1"/>
-          </a:fontRef>
-        </p:style>
-      </p:cxnSp>
-      <p:cxnSp>
-        <p:nvCxnSpPr>
-          <p:cNvPr id="27" name="Straight Connector 26"/>
-          <p:cNvCxnSpPr/>
-          <p:nvPr/>
-        </p:nvCxnSpPr>
-        <p:spPr>
-          <a:xfrm>
-            <a:off x="5618640" y="4269595"/>
-            <a:ext cx="0" cy="494872"/>
-          </a:xfrm>
-          <a:prstGeom prst="line">
-            <a:avLst/>
-          </a:prstGeom>
-        </p:spPr>
-        <p:style>
-          <a:lnRef idx="2">
-            <a:schemeClr val="accent3"/>
-          </a:lnRef>
-          <a:fillRef idx="0">
-            <a:schemeClr val="accent3"/>
-          </a:fillRef>
-          <a:effectRef idx="1">
-            <a:schemeClr val="accent3"/>
-          </a:effectRef>
-          <a:fontRef idx="minor">
-            <a:schemeClr val="tx1"/>
-          </a:fontRef>
-        </p:style>
-      </p:cxnSp>
-      <p:cxnSp>
-        <p:nvCxnSpPr>
-          <p:cNvPr id="28" name="Straight Connector 27"/>
-          <p:cNvCxnSpPr/>
-          <p:nvPr/>
-        </p:nvCxnSpPr>
-        <p:spPr>
-          <a:xfrm>
-            <a:off x="6274746" y="4269595"/>
-            <a:ext cx="0" cy="494872"/>
-          </a:xfrm>
-          <a:prstGeom prst="line">
-            <a:avLst/>
-          </a:prstGeom>
-        </p:spPr>
-        <p:style>
-          <a:lnRef idx="2">
-            <a:schemeClr val="accent3"/>
-          </a:lnRef>
-          <a:fillRef idx="0">
-            <a:schemeClr val="accent3"/>
-          </a:fillRef>
-          <a:effectRef idx="1">
-            <a:schemeClr val="accent3"/>
-          </a:effectRef>
-          <a:fontRef idx="minor">
-            <a:schemeClr val="tx1"/>
-          </a:fontRef>
-        </p:style>
-      </p:cxnSp>
-      <p:cxnSp>
-        <p:nvCxnSpPr>
-          <p:cNvPr id="29" name="Straight Connector 28"/>
-          <p:cNvCxnSpPr/>
-          <p:nvPr/>
-        </p:nvCxnSpPr>
-        <p:spPr>
-          <a:xfrm>
-            <a:off x="6886545" y="4269595"/>
-            <a:ext cx="0" cy="494872"/>
-          </a:xfrm>
-          <a:prstGeom prst="line">
-            <a:avLst/>
-          </a:prstGeom>
-        </p:spPr>
-        <p:style>
-          <a:lnRef idx="2">
-            <a:schemeClr val="accent3"/>
-          </a:lnRef>
-          <a:fillRef idx="0">
-            <a:schemeClr val="accent3"/>
-          </a:fillRef>
-          <a:effectRef idx="1">
-            <a:schemeClr val="accent3"/>
-          </a:effectRef>
-          <a:fontRef idx="minor">
-            <a:schemeClr val="tx1"/>
-          </a:fontRef>
-        </p:style>
-      </p:cxnSp>
-      <p:cxnSp>
-        <p:nvCxnSpPr>
-          <p:cNvPr id="30" name="Straight Connector 29"/>
-          <p:cNvCxnSpPr/>
-          <p:nvPr/>
-        </p:nvCxnSpPr>
-        <p:spPr>
-          <a:xfrm>
-            <a:off x="7484831" y="4269595"/>
-            <a:ext cx="0" cy="494872"/>
-          </a:xfrm>
-          <a:prstGeom prst="line">
-            <a:avLst/>
-          </a:prstGeom>
-        </p:spPr>
-        <p:style>
-          <a:lnRef idx="2">
-            <a:schemeClr val="accent3"/>
-          </a:lnRef>
-          <a:fillRef idx="0">
-            <a:schemeClr val="accent3"/>
-          </a:fillRef>
-          <a:effectRef idx="1">
-            <a:schemeClr val="accent3"/>
-          </a:effectRef>
-          <a:fontRef idx="minor">
-            <a:schemeClr val="tx1"/>
-          </a:fontRef>
-        </p:style>
-      </p:cxnSp>
-      <p:cxnSp>
-        <p:nvCxnSpPr>
-          <p:cNvPr id="31" name="Straight Connector 30"/>
-          <p:cNvCxnSpPr/>
-          <p:nvPr/>
-        </p:nvCxnSpPr>
-        <p:spPr>
-          <a:xfrm>
-            <a:off x="8123650" y="4259803"/>
-            <a:ext cx="0" cy="494872"/>
-          </a:xfrm>
-          <a:prstGeom prst="line">
-            <a:avLst/>
-          </a:prstGeom>
-        </p:spPr>
-        <p:style>
-          <a:lnRef idx="2">
-            <a:schemeClr val="accent3"/>
-          </a:lnRef>
-          <a:fillRef idx="0">
-            <a:schemeClr val="accent3"/>
-          </a:fillRef>
-          <a:effectRef idx="1">
-            <a:schemeClr val="accent3"/>
-          </a:effectRef>
-          <a:fontRef idx="minor">
-            <a:schemeClr val="tx1"/>
-          </a:fontRef>
-        </p:style>
-      </p:cxnSp>
-      <p:sp>
-        <p:nvSpPr>
-          <p:cNvPr id="32" name="TextBox 31"/>
+              <a:rPr lang="en-US" b="1" dirty="0" smtClean="0"/>
+              <a:t>Peer List</a:t>
+            </a:r>
+            <a:endParaRPr lang="en-US" b="1" dirty="0"/>
+          </a:p>
+        </p:txBody>
+      </p:sp>
+      <p:sp>
+        <p:nvSpPr>
+          <p:cNvPr id="35" name="TextBox 34"/>
           <p:cNvSpPr txBox="1"/>
           <p:nvPr/>
         </p:nvSpPr>
         <p:spPr>
           <a:xfrm>
-            <a:off x="4283537" y="4899657"/>
-            <a:ext cx="3968943" cy="369332"/>
+            <a:off x="4279769" y="2754997"/>
+            <a:ext cx="954934" cy="369332"/>
           </a:xfrm>
           <a:prstGeom prst="rect">
             <a:avLst/>
@@ -8200,70 +8456,220 @@
           <a:lstStyle/>
           <a:p>
             <a:r>
-              <a:rPr lang="en-US" dirty="0" smtClean="0"/>
-              <a:t>| 128 kb | 128 kb | 128 kb | … | 128 kb|</a:t>
-            </a:r>
-            <a:endParaRPr lang="en-US" dirty="0"/>
-          </a:p>
-        </p:txBody>
-      </p:sp>
-      <p:sp>
-        <p:nvSpPr>
-          <p:cNvPr id="3" name="TextBox 2"/>
-          <p:cNvSpPr txBox="1"/>
-          <p:nvPr/>
-        </p:nvSpPr>
-        <p:spPr>
-          <a:xfrm>
-            <a:off x="4283537" y="1792517"/>
-            <a:ext cx="1000582" cy="369332"/>
-          </a:xfrm>
-          <a:prstGeom prst="rect">
-            <a:avLst/>
-          </a:prstGeom>
-          <a:noFill/>
-        </p:spPr>
-        <p:txBody>
-          <a:bodyPr wrap="none" rtlCol="0">
-            <a:spAutoFit/>
-          </a:bodyPr>
-          <a:lstStyle/>
-          <a:p>
-            <a:r>
-              <a:rPr lang="en-US" b="1" dirty="0" smtClean="0"/>
-              <a:t>Peer List</a:t>
-            </a:r>
-            <a:endParaRPr lang="en-US" b="1" dirty="0"/>
-          </a:p>
-        </p:txBody>
-      </p:sp>
-      <p:sp>
-        <p:nvSpPr>
-          <p:cNvPr id="33" name="TextBox 32"/>
-          <p:cNvSpPr txBox="1"/>
-          <p:nvPr/>
-        </p:nvSpPr>
-        <p:spPr>
-          <a:xfrm>
-            <a:off x="4279769" y="3849307"/>
-            <a:ext cx="954934" cy="369332"/>
-          </a:xfrm>
-          <a:prstGeom prst="rect">
-            <a:avLst/>
-          </a:prstGeom>
-          <a:noFill/>
-        </p:spPr>
-        <p:txBody>
-          <a:bodyPr wrap="none" rtlCol="0">
-            <a:spAutoFit/>
-          </a:bodyPr>
-          <a:lstStyle/>
-          <a:p>
-            <a:r>
               <a:rPr lang="en-US" b="1" dirty="0" smtClean="0"/>
               <a:t>Content</a:t>
             </a:r>
             <a:endParaRPr lang="en-US" b="1" dirty="0"/>
+          </a:p>
+        </p:txBody>
+      </p:sp>
+      <p:sp>
+        <p:nvSpPr>
+          <p:cNvPr id="4" name="Rectangle 3"/>
+          <p:cNvSpPr/>
+          <p:nvPr/>
+        </p:nvSpPr>
+        <p:spPr>
+          <a:xfrm>
+            <a:off x="4526397" y="1445819"/>
+            <a:ext cx="2242933" cy="472596"/>
+          </a:xfrm>
+          <a:prstGeom prst="rect">
+            <a:avLst/>
+          </a:prstGeom>
+        </p:spPr>
+        <p:style>
+          <a:lnRef idx="1">
+            <a:schemeClr val="accent6"/>
+          </a:lnRef>
+          <a:fillRef idx="2">
+            <a:schemeClr val="accent6"/>
+          </a:fillRef>
+          <a:effectRef idx="1">
+            <a:schemeClr val="accent6"/>
+          </a:effectRef>
+          <a:fontRef idx="minor">
+            <a:schemeClr val="dk1"/>
+          </a:fontRef>
+        </p:style>
+        <p:txBody>
+          <a:bodyPr rtlCol="0" anchor="ctr"/>
+          <a:lstStyle/>
+          <a:p>
+            <a:pPr algn="ctr"/>
+            <a:r>
+              <a:rPr lang="en-US" dirty="0" smtClean="0"/>
+              <a:t>Recipient IP Address</a:t>
+            </a:r>
+            <a:endParaRPr lang="en-US" dirty="0"/>
+          </a:p>
+        </p:txBody>
+      </p:sp>
+      <p:sp>
+        <p:nvSpPr>
+          <p:cNvPr id="38" name="Rectangle 37"/>
+          <p:cNvSpPr/>
+          <p:nvPr/>
+        </p:nvSpPr>
+        <p:spPr>
+          <a:xfrm>
+            <a:off x="4526397" y="3164513"/>
+            <a:ext cx="2242933" cy="472596"/>
+          </a:xfrm>
+          <a:prstGeom prst="rect">
+            <a:avLst/>
+          </a:prstGeom>
+        </p:spPr>
+        <p:style>
+          <a:lnRef idx="1">
+            <a:schemeClr val="accent6"/>
+          </a:lnRef>
+          <a:fillRef idx="2">
+            <a:schemeClr val="accent6"/>
+          </a:fillRef>
+          <a:effectRef idx="1">
+            <a:schemeClr val="accent6"/>
+          </a:effectRef>
+          <a:fontRef idx="minor">
+            <a:schemeClr val="dk1"/>
+          </a:fontRef>
+        </p:style>
+        <p:txBody>
+          <a:bodyPr rtlCol="0" anchor="ctr"/>
+          <a:lstStyle/>
+          <a:p>
+            <a:pPr algn="ctr"/>
+            <a:r>
+              <a:rPr lang="en-US" dirty="0" smtClean="0"/>
+              <a:t>Recipient IP Address</a:t>
+            </a:r>
+            <a:endParaRPr lang="en-US" dirty="0"/>
+          </a:p>
+        </p:txBody>
+      </p:sp>
+      <p:sp>
+        <p:nvSpPr>
+          <p:cNvPr id="39" name="Rectangle 38"/>
+          <p:cNvSpPr/>
+          <p:nvPr/>
+        </p:nvSpPr>
+        <p:spPr>
+          <a:xfrm>
+            <a:off x="4526397" y="3729863"/>
+            <a:ext cx="2242933" cy="472596"/>
+          </a:xfrm>
+          <a:prstGeom prst="rect">
+            <a:avLst/>
+          </a:prstGeom>
+        </p:spPr>
+        <p:style>
+          <a:lnRef idx="1">
+            <a:schemeClr val="accent6"/>
+          </a:lnRef>
+          <a:fillRef idx="2">
+            <a:schemeClr val="accent6"/>
+          </a:fillRef>
+          <a:effectRef idx="1">
+            <a:schemeClr val="accent6"/>
+          </a:effectRef>
+          <a:fontRef idx="minor">
+            <a:schemeClr val="dk1"/>
+          </a:fontRef>
+        </p:style>
+        <p:txBody>
+          <a:bodyPr rtlCol="0" anchor="ctr"/>
+          <a:lstStyle/>
+          <a:p>
+            <a:pPr algn="ctr"/>
+            <a:r>
+              <a:rPr lang="en-US" dirty="0" smtClean="0"/>
+              <a:t>Sender IP Address</a:t>
+            </a:r>
+            <a:endParaRPr lang="en-US" dirty="0"/>
+          </a:p>
+        </p:txBody>
+      </p:sp>
+      <p:sp>
+        <p:nvSpPr>
+          <p:cNvPr id="40" name="Rectangle 39"/>
+          <p:cNvSpPr/>
+          <p:nvPr/>
+        </p:nvSpPr>
+        <p:spPr>
+          <a:xfrm>
+            <a:off x="4526397" y="4300819"/>
+            <a:ext cx="2242933" cy="472596"/>
+          </a:xfrm>
+          <a:prstGeom prst="rect">
+            <a:avLst/>
+          </a:prstGeom>
+        </p:spPr>
+        <p:style>
+          <a:lnRef idx="1">
+            <a:schemeClr val="accent6"/>
+          </a:lnRef>
+          <a:fillRef idx="2">
+            <a:schemeClr val="accent6"/>
+          </a:fillRef>
+          <a:effectRef idx="1">
+            <a:schemeClr val="accent6"/>
+          </a:effectRef>
+          <a:fontRef idx="minor">
+            <a:schemeClr val="dk1"/>
+          </a:fontRef>
+        </p:style>
+        <p:txBody>
+          <a:bodyPr rtlCol="0" anchor="ctr"/>
+          <a:lstStyle/>
+          <a:p>
+            <a:pPr algn="ctr"/>
+            <a:r>
+              <a:rPr lang="en-US" dirty="0" smtClean="0"/>
+              <a:t>Message Code</a:t>
+            </a:r>
+            <a:endParaRPr lang="en-US" dirty="0"/>
+          </a:p>
+        </p:txBody>
+      </p:sp>
+      <p:sp>
+        <p:nvSpPr>
+          <p:cNvPr id="41" name="Rectangle 40"/>
+          <p:cNvSpPr/>
+          <p:nvPr/>
+        </p:nvSpPr>
+        <p:spPr>
+          <a:xfrm>
+            <a:off x="4526397" y="4852153"/>
+            <a:ext cx="2242933" cy="472596"/>
+          </a:xfrm>
+          <a:prstGeom prst="rect">
+            <a:avLst/>
+          </a:prstGeom>
+        </p:spPr>
+        <p:style>
+          <a:lnRef idx="1">
+            <a:schemeClr val="accent6"/>
+          </a:lnRef>
+          <a:fillRef idx="2">
+            <a:schemeClr val="accent6"/>
+          </a:fillRef>
+          <a:effectRef idx="1">
+            <a:schemeClr val="accent6"/>
+          </a:effectRef>
+          <a:fontRef idx="minor">
+            <a:schemeClr val="dk1"/>
+          </a:fontRef>
+        </p:style>
+        <p:txBody>
+          <a:bodyPr rtlCol="0" anchor="ctr"/>
+          <a:lstStyle/>
+          <a:p>
+            <a:pPr algn="ctr"/>
+            <a:r>
+              <a:rPr lang="en-US" dirty="0" smtClean="0"/>
+              <a:t>Content</a:t>
+            </a:r>
+            <a:endParaRPr lang="en-US" dirty="0"/>
           </a:p>
         </p:txBody>
       </p:sp>
@@ -8304,128 +8710,6 @@
           <a:chExt cx="0" cy="0"/>
         </a:xfrm>
       </p:grpSpPr>
-      <p:sp>
-        <p:nvSpPr>
-          <p:cNvPr id="3" name="Rounded Rectangle 2"/>
-          <p:cNvSpPr/>
-          <p:nvPr/>
-        </p:nvSpPr>
-        <p:spPr>
-          <a:xfrm>
-            <a:off x="593793" y="280424"/>
-            <a:ext cx="7900746" cy="6251790"/>
-          </a:xfrm>
-          <a:prstGeom prst="roundRect">
-            <a:avLst/>
-          </a:prstGeom>
-        </p:spPr>
-        <p:style>
-          <a:lnRef idx="1">
-            <a:schemeClr val="accent6"/>
-          </a:lnRef>
-          <a:fillRef idx="3">
-            <a:schemeClr val="accent6"/>
-          </a:fillRef>
-          <a:effectRef idx="2">
-            <a:schemeClr val="accent6"/>
-          </a:effectRef>
-          <a:fontRef idx="minor">
-            <a:schemeClr val="lt1"/>
-          </a:fontRef>
-        </p:style>
-        <p:txBody>
-          <a:bodyPr rtlCol="0" anchor="ctr"/>
-          <a:lstStyle/>
-          <a:p>
-            <a:pPr algn="ctr"/>
-            <a:endParaRPr lang="en-US" sz="3200" dirty="0"/>
-          </a:p>
-        </p:txBody>
-      </p:sp>
-      <p:sp>
-        <p:nvSpPr>
-          <p:cNvPr id="4" name="Rounded Rectangle 3"/>
-          <p:cNvSpPr/>
-          <p:nvPr/>
-        </p:nvSpPr>
-        <p:spPr>
-          <a:xfrm>
-            <a:off x="1138103" y="956731"/>
-            <a:ext cx="3315345" cy="2540306"/>
-          </a:xfrm>
-          <a:prstGeom prst="roundRect">
-            <a:avLst/>
-          </a:prstGeom>
-        </p:spPr>
-        <p:style>
-          <a:lnRef idx="1">
-            <a:schemeClr val="accent3"/>
-          </a:lnRef>
-          <a:fillRef idx="3">
-            <a:schemeClr val="accent3"/>
-          </a:fillRef>
-          <a:effectRef idx="2">
-            <a:schemeClr val="accent3"/>
-          </a:effectRef>
-          <a:fontRef idx="minor">
-            <a:schemeClr val="lt1"/>
-          </a:fontRef>
-        </p:style>
-        <p:txBody>
-          <a:bodyPr rtlCol="0" anchor="ctr"/>
-          <a:lstStyle/>
-          <a:p>
-            <a:pPr algn="ctr"/>
-            <a:r>
-              <a:rPr lang="en-US" sz="3200" b="1" dirty="0" smtClean="0"/>
-              <a:t>Orange Protocol</a:t>
-            </a:r>
-            <a:endParaRPr lang="en-US" sz="3200" b="1" dirty="0"/>
-          </a:p>
-        </p:txBody>
-      </p:sp>
-      <p:sp>
-        <p:nvSpPr>
-          <p:cNvPr id="5" name="Rounded Rectangle 4"/>
-          <p:cNvSpPr/>
-          <p:nvPr/>
-        </p:nvSpPr>
-        <p:spPr>
-          <a:xfrm>
-            <a:off x="1138103" y="3661987"/>
-            <a:ext cx="3315345" cy="2540306"/>
-          </a:xfrm>
-          <a:prstGeom prst="roundRect">
-            <a:avLst/>
-          </a:prstGeom>
-        </p:spPr>
-        <p:style>
-          <a:lnRef idx="1">
-            <a:schemeClr val="accent3"/>
-          </a:lnRef>
-          <a:fillRef idx="3">
-            <a:schemeClr val="accent3"/>
-          </a:fillRef>
-          <a:effectRef idx="2">
-            <a:schemeClr val="accent3"/>
-          </a:effectRef>
-          <a:fontRef idx="minor">
-            <a:schemeClr val="lt1"/>
-          </a:fontRef>
-        </p:style>
-        <p:txBody>
-          <a:bodyPr rtlCol="0" anchor="ctr"/>
-          <a:lstStyle/>
-          <a:p>
-            <a:pPr algn="ctr"/>
-            <a:r>
-              <a:rPr lang="en-US" sz="3200" b="1" dirty="0" smtClean="0"/>
-              <a:t>Orange Observer</a:t>
-            </a:r>
-            <a:endParaRPr lang="en-US" sz="3200" b="1" dirty="0"/>
-          </a:p>
-        </p:txBody>
-      </p:sp>
       <p:graphicFrame>
         <p:nvGraphicFramePr>
           <p:cNvPr id="9" name="Table 8"/>
@@ -8435,14 +8719,14 @@
           <p:nvPr>
             <p:extLst>
               <p:ext uri="{D42A27DB-BD31-4B8C-83A1-F6EECF244321}">
-                <p14:modId xmlns:p14="http://schemas.microsoft.com/office/powerpoint/2010/main" val="2076118084"/>
+                <p14:modId xmlns:p14="http://schemas.microsoft.com/office/powerpoint/2010/main" val="105342534"/>
               </p:ext>
             </p:extLst>
           </p:nvPr>
         </p:nvGraphicFramePr>
         <p:xfrm>
-          <a:off x="5562513" y="956731"/>
-          <a:ext cx="2045287" cy="5069224"/>
+          <a:off x="711835" y="959573"/>
+          <a:ext cx="2922795" cy="5069224"/>
         </p:xfrm>
         <a:graphic>
           <a:graphicData uri="http://schemas.openxmlformats.org/drawingml/2006/table">
@@ -8451,7 +8735,8 @@
                 <a:tableStyleId>{22838BEF-8BB2-4498-84A7-C5851F593DF1}</a:tableStyleId>
               </a:tblPr>
               <a:tblGrid>
-                <a:gridCol w="2045287"/>
+                <a:gridCol w="1855376"/>
+                <a:gridCol w="1067419"/>
               </a:tblGrid>
               <a:tr h="633653">
                 <a:tc>
@@ -8463,6 +8748,20 @@
                     </a:p>
                   </a:txBody>
                   <a:tcPr/>
+                </a:tc>
+                <a:tc>
+                  <a:txBody>
+                    <a:bodyPr/>
+                    <a:lstStyle/>
+                    <a:p>
+                      <a:r>
+                        <a:rPr lang="en-US" b="0" dirty="0" smtClean="0"/>
+                        <a:t>Peer list</a:t>
+                      </a:r>
+                      <a:endParaRPr lang="en-US" b="0" dirty="0"/>
+                    </a:p>
+                  </a:txBody>
+                  <a:tcPr anchor="ctr"/>
                 </a:tc>
               </a:tr>
               <a:tr h="633653">
@@ -8476,6 +8775,20 @@
                   </a:txBody>
                   <a:tcPr/>
                 </a:tc>
+                <a:tc>
+                  <a:txBody>
+                    <a:bodyPr/>
+                    <a:lstStyle/>
+                    <a:p>
+                      <a:r>
+                        <a:rPr lang="en-US" dirty="0" smtClean="0"/>
+                        <a:t>Content</a:t>
+                      </a:r>
+                      <a:endParaRPr lang="en-US" dirty="0"/>
+                    </a:p>
+                  </a:txBody>
+                  <a:tcPr anchor="ctr"/>
+                </a:tc>
               </a:tr>
               <a:tr h="633653">
                 <a:tc>
@@ -8487,6 +8800,20 @@
                     </a:p>
                   </a:txBody>
                   <a:tcPr/>
+                </a:tc>
+                <a:tc>
+                  <a:txBody>
+                    <a:bodyPr/>
+                    <a:lstStyle/>
+                    <a:p>
+                      <a:r>
+                        <a:rPr lang="en-US" dirty="0" smtClean="0"/>
+                        <a:t>Content</a:t>
+                      </a:r>
+                      <a:endParaRPr lang="en-US" dirty="0"/>
+                    </a:p>
+                  </a:txBody>
+                  <a:tcPr anchor="ctr"/>
                 </a:tc>
               </a:tr>
               <a:tr h="633653">
@@ -8500,6 +8827,20 @@
                   </a:txBody>
                   <a:tcPr/>
                 </a:tc>
+                <a:tc>
+                  <a:txBody>
+                    <a:bodyPr/>
+                    <a:lstStyle/>
+                    <a:p>
+                      <a:r>
+                        <a:rPr lang="en-US" dirty="0" smtClean="0"/>
+                        <a:t>Peer list</a:t>
+                      </a:r>
+                      <a:endParaRPr lang="en-US" dirty="0"/>
+                    </a:p>
+                  </a:txBody>
+                  <a:tcPr anchor="ctr"/>
+                </a:tc>
               </a:tr>
               <a:tr h="633653">
                 <a:tc>
@@ -8511,6 +8852,20 @@
                     </a:p>
                   </a:txBody>
                   <a:tcPr/>
+                </a:tc>
+                <a:tc>
+                  <a:txBody>
+                    <a:bodyPr/>
+                    <a:lstStyle/>
+                    <a:p>
+                      <a:r>
+                        <a:rPr lang="en-US" dirty="0" smtClean="0"/>
+                        <a:t>Content</a:t>
+                      </a:r>
+                      <a:endParaRPr lang="en-US" dirty="0"/>
+                    </a:p>
+                  </a:txBody>
+                  <a:tcPr anchor="ctr"/>
                 </a:tc>
               </a:tr>
               <a:tr h="633653">
@@ -8524,17 +8879,19 @@
                   </a:txBody>
                   <a:tcPr/>
                 </a:tc>
-              </a:tr>
-              <a:tr h="633653">
                 <a:tc>
                   <a:txBody>
                     <a:bodyPr/>
                     <a:lstStyle/>
                     <a:p>
+                      <a:r>
+                        <a:rPr lang="en-US" dirty="0" smtClean="0"/>
+                        <a:t>Peer list</a:t>
+                      </a:r>
                       <a:endParaRPr lang="en-US" dirty="0"/>
                     </a:p>
                   </a:txBody>
-                  <a:tcPr/>
+                  <a:tcPr anchor="ctr"/>
                 </a:tc>
               </a:tr>
               <a:tr h="633653">
@@ -8548,6 +8905,46 @@
                   </a:txBody>
                   <a:tcPr/>
                 </a:tc>
+                <a:tc>
+                  <a:txBody>
+                    <a:bodyPr/>
+                    <a:lstStyle/>
+                    <a:p>
+                      <a:r>
+                        <a:rPr lang="en-US" dirty="0" smtClean="0"/>
+                        <a:t>Peer list</a:t>
+                      </a:r>
+                      <a:endParaRPr lang="en-US" dirty="0"/>
+                    </a:p>
+                  </a:txBody>
+                  <a:tcPr anchor="ctr"/>
+                </a:tc>
+              </a:tr>
+              <a:tr h="633653">
+                <a:tc>
+                  <a:txBody>
+                    <a:bodyPr/>
+                    <a:lstStyle/>
+                    <a:p>
+                      <a:endParaRPr lang="en-US" dirty="0"/>
+                    </a:p>
+                  </a:txBody>
+                  <a:tcPr/>
+                </a:tc>
+                <a:tc>
+                  <a:txBody>
+                    <a:bodyPr/>
+                    <a:lstStyle/>
+                    <a:p>
+                      <a:r>
+                        <a:rPr lang="en-US" dirty="0" smtClean="0"/>
+                        <a:t>Content</a:t>
+                      </a:r>
+                      <a:endParaRPr lang="en-US" dirty="0"/>
+                    </a:p>
+                  </a:txBody>
+                  <a:tcPr anchor="ctr"/>
+                </a:tc>
               </a:tr>
             </a:tbl>
           </a:graphicData>
@@ -8561,7 +8958,7 @@
         </p:nvSpPr>
         <p:spPr>
           <a:xfrm>
-            <a:off x="5937931" y="1034073"/>
+            <a:off x="1033205" y="1036915"/>
             <a:ext cx="1319116" cy="494872"/>
           </a:xfrm>
           <a:prstGeom prst="rect">
@@ -8603,7 +9000,7 @@
         </p:nvSpPr>
         <p:spPr>
           <a:xfrm>
-            <a:off x="5937931" y="1664135"/>
+            <a:off x="1046717" y="1666977"/>
             <a:ext cx="1319116" cy="494872"/>
           </a:xfrm>
           <a:prstGeom prst="rect">
@@ -8645,7 +9042,7 @@
         </p:nvSpPr>
         <p:spPr>
           <a:xfrm>
-            <a:off x="5937931" y="2297639"/>
+            <a:off x="1046717" y="2300481"/>
             <a:ext cx="1319116" cy="494872"/>
           </a:xfrm>
           <a:prstGeom prst="rect">
@@ -8687,7 +9084,7 @@
         </p:nvSpPr>
         <p:spPr>
           <a:xfrm>
-            <a:off x="5937931" y="2920819"/>
+            <a:off x="1046717" y="2923661"/>
             <a:ext cx="1319116" cy="494872"/>
           </a:xfrm>
           <a:prstGeom prst="rect">
@@ -8729,7 +9126,7 @@
         </p:nvSpPr>
         <p:spPr>
           <a:xfrm>
-            <a:off x="5937931" y="3555792"/>
+            <a:off x="1046717" y="3558634"/>
             <a:ext cx="1319116" cy="494872"/>
           </a:xfrm>
           <a:prstGeom prst="rect">
@@ -8771,7 +9168,7 @@
         </p:nvSpPr>
         <p:spPr>
           <a:xfrm>
-            <a:off x="5937931" y="4189296"/>
+            <a:off x="1046717" y="4192138"/>
             <a:ext cx="1319116" cy="494872"/>
           </a:xfrm>
           <a:prstGeom prst="rect">
@@ -8813,7 +9210,7 @@
         </p:nvSpPr>
         <p:spPr>
           <a:xfrm>
-            <a:off x="5937931" y="4805593"/>
+            <a:off x="1046717" y="4808435"/>
             <a:ext cx="1319116" cy="494872"/>
           </a:xfrm>
           <a:prstGeom prst="rect">
@@ -8855,7 +9252,7 @@
         </p:nvSpPr>
         <p:spPr>
           <a:xfrm>
-            <a:off x="5937931" y="5452865"/>
+            <a:off x="1046717" y="5455707"/>
             <a:ext cx="1319116" cy="494872"/>
           </a:xfrm>
           <a:prstGeom prst="rect">
@@ -8889,33 +9286,68 @@
           </a:p>
         </p:txBody>
       </p:sp>
+      <p:sp>
+        <p:nvSpPr>
+          <p:cNvPr id="20" name="Rectangle 19"/>
+          <p:cNvSpPr/>
+          <p:nvPr/>
+        </p:nvSpPr>
+        <p:spPr>
+          <a:xfrm>
+            <a:off x="4279769" y="2266325"/>
+            <a:ext cx="4529818" cy="494872"/>
+          </a:xfrm>
+          <a:prstGeom prst="rect">
+            <a:avLst/>
+          </a:prstGeom>
+        </p:spPr>
+        <p:style>
+          <a:lnRef idx="3">
+            <a:schemeClr val="lt1"/>
+          </a:lnRef>
+          <a:fillRef idx="1">
+            <a:schemeClr val="accent3"/>
+          </a:fillRef>
+          <a:effectRef idx="1">
+            <a:schemeClr val="accent3"/>
+          </a:effectRef>
+          <a:fontRef idx="minor">
+            <a:schemeClr val="lt1"/>
+          </a:fontRef>
+        </p:style>
+        <p:txBody>
+          <a:bodyPr rtlCol="0" anchor="ctr"/>
+          <a:lstStyle/>
+          <a:p>
+            <a:pPr algn="ctr"/>
+            <a:endParaRPr lang="en-US" dirty="0"/>
+          </a:p>
+        </p:txBody>
+      </p:sp>
       <p:cxnSp>
         <p:nvCxnSpPr>
-          <p:cNvPr id="19" name="Straight Arrow Connector 18"/>
+          <p:cNvPr id="10" name="Straight Connector 9"/>
           <p:cNvCxnSpPr/>
           <p:nvPr/>
         </p:nvCxnSpPr>
         <p:spPr>
           <a:xfrm>
-            <a:off x="4453448" y="1554532"/>
-            <a:ext cx="1109065" cy="0"/>
-          </a:xfrm>
-          <a:prstGeom prst="straightConnector1">
-            <a:avLst/>
-          </a:prstGeom>
-          <a:ln w="76200" cmpd="sng">
-            <a:tailEnd type="arrow"/>
-          </a:ln>
+            <a:off x="4945257" y="2266325"/>
+            <a:ext cx="0" cy="494872"/>
+          </a:xfrm>
+          <a:prstGeom prst="line">
+            <a:avLst/>
+          </a:prstGeom>
         </p:spPr>
         <p:style>
           <a:lnRef idx="2">
-            <a:schemeClr val="dk1"/>
+            <a:schemeClr val="accent3"/>
           </a:lnRef>
           <a:fillRef idx="0">
-            <a:schemeClr val="dk1"/>
+            <a:schemeClr val="accent3"/>
           </a:fillRef>
           <a:effectRef idx="1">
-            <a:schemeClr val="dk1"/>
+            <a:schemeClr val="accent3"/>
           </a:effectRef>
           <a:fontRef idx="minor">
             <a:schemeClr val="tx1"/>
@@ -8924,44 +9356,496 @@
       </p:cxnSp>
       <p:cxnSp>
         <p:nvCxnSpPr>
-          <p:cNvPr id="10" name="Curved Connector 9"/>
-          <p:cNvCxnSpPr>
-            <a:stCxn id="9" idx="0"/>
-          </p:cNvCxnSpPr>
+          <p:cNvPr id="19" name="Straight Connector 18"/>
+          <p:cNvCxnSpPr/>
           <p:nvPr/>
         </p:nvCxnSpPr>
         <p:spPr>
-          <a:xfrm rot="5400000" flipH="1" flipV="1">
-            <a:off x="7201694" y="-336113"/>
-            <a:ext cx="676306" cy="1909383"/>
-          </a:xfrm>
-          <a:prstGeom prst="curvedConnector2">
-            <a:avLst/>
-          </a:prstGeom>
-          <a:ln w="76200" cmpd="sng">
-            <a:prstDash val="sysDash"/>
-            <a:tailEnd type="arrow"/>
-          </a:ln>
+          <a:xfrm>
+            <a:off x="5614872" y="2266325"/>
+            <a:ext cx="0" cy="494872"/>
+          </a:xfrm>
+          <a:prstGeom prst="line">
+            <a:avLst/>
+          </a:prstGeom>
         </p:spPr>
         <p:style>
           <a:lnRef idx="2">
-            <a:schemeClr val="accent1"/>
+            <a:schemeClr val="accent3"/>
           </a:lnRef>
           <a:fillRef idx="0">
-            <a:schemeClr val="accent1"/>
+            <a:schemeClr val="accent3"/>
           </a:fillRef>
           <a:effectRef idx="1">
-            <a:schemeClr val="accent1"/>
+            <a:schemeClr val="accent3"/>
           </a:effectRef>
           <a:fontRef idx="minor">
             <a:schemeClr val="tx1"/>
           </a:fontRef>
         </p:style>
       </p:cxnSp>
+      <p:cxnSp>
+        <p:nvCxnSpPr>
+          <p:cNvPr id="21" name="Straight Connector 20"/>
+          <p:cNvCxnSpPr/>
+          <p:nvPr/>
+        </p:nvCxnSpPr>
+        <p:spPr>
+          <a:xfrm>
+            <a:off x="6270978" y="2266325"/>
+            <a:ext cx="0" cy="494872"/>
+          </a:xfrm>
+          <a:prstGeom prst="line">
+            <a:avLst/>
+          </a:prstGeom>
+        </p:spPr>
+        <p:style>
+          <a:lnRef idx="2">
+            <a:schemeClr val="accent3"/>
+          </a:lnRef>
+          <a:fillRef idx="0">
+            <a:schemeClr val="accent3"/>
+          </a:fillRef>
+          <a:effectRef idx="1">
+            <a:schemeClr val="accent3"/>
+          </a:effectRef>
+          <a:fontRef idx="minor">
+            <a:schemeClr val="tx1"/>
+          </a:fontRef>
+        </p:style>
+      </p:cxnSp>
+      <p:cxnSp>
+        <p:nvCxnSpPr>
+          <p:cNvPr id="22" name="Straight Connector 21"/>
+          <p:cNvCxnSpPr/>
+          <p:nvPr/>
+        </p:nvCxnSpPr>
+        <p:spPr>
+          <a:xfrm>
+            <a:off x="6882777" y="2266325"/>
+            <a:ext cx="0" cy="494872"/>
+          </a:xfrm>
+          <a:prstGeom prst="line">
+            <a:avLst/>
+          </a:prstGeom>
+        </p:spPr>
+        <p:style>
+          <a:lnRef idx="2">
+            <a:schemeClr val="accent3"/>
+          </a:lnRef>
+          <a:fillRef idx="0">
+            <a:schemeClr val="accent3"/>
+          </a:fillRef>
+          <a:effectRef idx="1">
+            <a:schemeClr val="accent3"/>
+          </a:effectRef>
+          <a:fontRef idx="minor">
+            <a:schemeClr val="tx1"/>
+          </a:fontRef>
+        </p:style>
+      </p:cxnSp>
+      <p:cxnSp>
+        <p:nvCxnSpPr>
+          <p:cNvPr id="23" name="Straight Connector 22"/>
+          <p:cNvCxnSpPr/>
+          <p:nvPr/>
+        </p:nvCxnSpPr>
+        <p:spPr>
+          <a:xfrm>
+            <a:off x="7481063" y="2266325"/>
+            <a:ext cx="0" cy="494872"/>
+          </a:xfrm>
+          <a:prstGeom prst="line">
+            <a:avLst/>
+          </a:prstGeom>
+        </p:spPr>
+        <p:style>
+          <a:lnRef idx="2">
+            <a:schemeClr val="accent3"/>
+          </a:lnRef>
+          <a:fillRef idx="0">
+            <a:schemeClr val="accent3"/>
+          </a:fillRef>
+          <a:effectRef idx="1">
+            <a:schemeClr val="accent3"/>
+          </a:effectRef>
+          <a:fontRef idx="minor">
+            <a:schemeClr val="tx1"/>
+          </a:fontRef>
+        </p:style>
+      </p:cxnSp>
+      <p:cxnSp>
+        <p:nvCxnSpPr>
+          <p:cNvPr id="24" name="Straight Connector 23"/>
+          <p:cNvCxnSpPr/>
+          <p:nvPr/>
+        </p:nvCxnSpPr>
+        <p:spPr>
+          <a:xfrm>
+            <a:off x="8119882" y="2256533"/>
+            <a:ext cx="0" cy="494872"/>
+          </a:xfrm>
+          <a:prstGeom prst="line">
+            <a:avLst/>
+          </a:prstGeom>
+        </p:spPr>
+        <p:style>
+          <a:lnRef idx="2">
+            <a:schemeClr val="accent3"/>
+          </a:lnRef>
+          <a:fillRef idx="0">
+            <a:schemeClr val="accent3"/>
+          </a:fillRef>
+          <a:effectRef idx="1">
+            <a:schemeClr val="accent3"/>
+          </a:effectRef>
+          <a:fontRef idx="minor">
+            <a:schemeClr val="tx1"/>
+          </a:fontRef>
+        </p:style>
+      </p:cxnSp>
+      <p:sp>
+        <p:nvSpPr>
+          <p:cNvPr id="2" name="TextBox 1"/>
+          <p:cNvSpPr txBox="1"/>
+          <p:nvPr/>
+        </p:nvSpPr>
+        <p:spPr>
+          <a:xfrm>
+            <a:off x="4279769" y="2896387"/>
+            <a:ext cx="3968943" cy="369332"/>
+          </a:xfrm>
+          <a:prstGeom prst="rect">
+            <a:avLst/>
+          </a:prstGeom>
+          <a:noFill/>
+        </p:spPr>
+        <p:txBody>
+          <a:bodyPr wrap="none" rtlCol="0">
+            <a:spAutoFit/>
+          </a:bodyPr>
+          <a:lstStyle/>
+          <a:p>
+            <a:r>
+              <a:rPr lang="en-US" dirty="0" smtClean="0"/>
+              <a:t>| 128 kb | 128 kb | 128 kb | … | 128 kb|</a:t>
+            </a:r>
+            <a:endParaRPr lang="en-US" dirty="0"/>
+          </a:p>
+        </p:txBody>
+      </p:sp>
+      <p:sp>
+        <p:nvSpPr>
+          <p:cNvPr id="25" name="Rectangle 24"/>
+          <p:cNvSpPr/>
+          <p:nvPr/>
+        </p:nvSpPr>
+        <p:spPr>
+          <a:xfrm>
+            <a:off x="4283537" y="4269595"/>
+            <a:ext cx="4529818" cy="494872"/>
+          </a:xfrm>
+          <a:prstGeom prst="rect">
+            <a:avLst/>
+          </a:prstGeom>
+        </p:spPr>
+        <p:style>
+          <a:lnRef idx="3">
+            <a:schemeClr val="lt1"/>
+          </a:lnRef>
+          <a:fillRef idx="1">
+            <a:schemeClr val="accent3"/>
+          </a:fillRef>
+          <a:effectRef idx="1">
+            <a:schemeClr val="accent3"/>
+          </a:effectRef>
+          <a:fontRef idx="minor">
+            <a:schemeClr val="lt1"/>
+          </a:fontRef>
+        </p:style>
+        <p:txBody>
+          <a:bodyPr rtlCol="0" anchor="ctr"/>
+          <a:lstStyle/>
+          <a:p>
+            <a:pPr algn="ctr"/>
+            <a:endParaRPr lang="en-US" dirty="0"/>
+          </a:p>
+        </p:txBody>
+      </p:sp>
+      <p:cxnSp>
+        <p:nvCxnSpPr>
+          <p:cNvPr id="26" name="Straight Connector 25"/>
+          <p:cNvCxnSpPr/>
+          <p:nvPr/>
+        </p:nvCxnSpPr>
+        <p:spPr>
+          <a:xfrm>
+            <a:off x="4949025" y="4269595"/>
+            <a:ext cx="0" cy="494872"/>
+          </a:xfrm>
+          <a:prstGeom prst="line">
+            <a:avLst/>
+          </a:prstGeom>
+        </p:spPr>
+        <p:style>
+          <a:lnRef idx="2">
+            <a:schemeClr val="accent3"/>
+          </a:lnRef>
+          <a:fillRef idx="0">
+            <a:schemeClr val="accent3"/>
+          </a:fillRef>
+          <a:effectRef idx="1">
+            <a:schemeClr val="accent3"/>
+          </a:effectRef>
+          <a:fontRef idx="minor">
+            <a:schemeClr val="tx1"/>
+          </a:fontRef>
+        </p:style>
+      </p:cxnSp>
+      <p:cxnSp>
+        <p:nvCxnSpPr>
+          <p:cNvPr id="27" name="Straight Connector 26"/>
+          <p:cNvCxnSpPr/>
+          <p:nvPr/>
+        </p:nvCxnSpPr>
+        <p:spPr>
+          <a:xfrm>
+            <a:off x="5618640" y="4269595"/>
+            <a:ext cx="0" cy="494872"/>
+          </a:xfrm>
+          <a:prstGeom prst="line">
+            <a:avLst/>
+          </a:prstGeom>
+        </p:spPr>
+        <p:style>
+          <a:lnRef idx="2">
+            <a:schemeClr val="accent3"/>
+          </a:lnRef>
+          <a:fillRef idx="0">
+            <a:schemeClr val="accent3"/>
+          </a:fillRef>
+          <a:effectRef idx="1">
+            <a:schemeClr val="accent3"/>
+          </a:effectRef>
+          <a:fontRef idx="minor">
+            <a:schemeClr val="tx1"/>
+          </a:fontRef>
+        </p:style>
+      </p:cxnSp>
+      <p:cxnSp>
+        <p:nvCxnSpPr>
+          <p:cNvPr id="28" name="Straight Connector 27"/>
+          <p:cNvCxnSpPr/>
+          <p:nvPr/>
+        </p:nvCxnSpPr>
+        <p:spPr>
+          <a:xfrm>
+            <a:off x="6274746" y="4269595"/>
+            <a:ext cx="0" cy="494872"/>
+          </a:xfrm>
+          <a:prstGeom prst="line">
+            <a:avLst/>
+          </a:prstGeom>
+        </p:spPr>
+        <p:style>
+          <a:lnRef idx="2">
+            <a:schemeClr val="accent3"/>
+          </a:lnRef>
+          <a:fillRef idx="0">
+            <a:schemeClr val="accent3"/>
+          </a:fillRef>
+          <a:effectRef idx="1">
+            <a:schemeClr val="accent3"/>
+          </a:effectRef>
+          <a:fontRef idx="minor">
+            <a:schemeClr val="tx1"/>
+          </a:fontRef>
+        </p:style>
+      </p:cxnSp>
+      <p:cxnSp>
+        <p:nvCxnSpPr>
+          <p:cNvPr id="29" name="Straight Connector 28"/>
+          <p:cNvCxnSpPr/>
+          <p:nvPr/>
+        </p:nvCxnSpPr>
+        <p:spPr>
+          <a:xfrm>
+            <a:off x="6886545" y="4269595"/>
+            <a:ext cx="0" cy="494872"/>
+          </a:xfrm>
+          <a:prstGeom prst="line">
+            <a:avLst/>
+          </a:prstGeom>
+        </p:spPr>
+        <p:style>
+          <a:lnRef idx="2">
+            <a:schemeClr val="accent3"/>
+          </a:lnRef>
+          <a:fillRef idx="0">
+            <a:schemeClr val="accent3"/>
+          </a:fillRef>
+          <a:effectRef idx="1">
+            <a:schemeClr val="accent3"/>
+          </a:effectRef>
+          <a:fontRef idx="minor">
+            <a:schemeClr val="tx1"/>
+          </a:fontRef>
+        </p:style>
+      </p:cxnSp>
+      <p:cxnSp>
+        <p:nvCxnSpPr>
+          <p:cNvPr id="30" name="Straight Connector 29"/>
+          <p:cNvCxnSpPr/>
+          <p:nvPr/>
+        </p:nvCxnSpPr>
+        <p:spPr>
+          <a:xfrm>
+            <a:off x="7484831" y="4269595"/>
+            <a:ext cx="0" cy="494872"/>
+          </a:xfrm>
+          <a:prstGeom prst="line">
+            <a:avLst/>
+          </a:prstGeom>
+        </p:spPr>
+        <p:style>
+          <a:lnRef idx="2">
+            <a:schemeClr val="accent3"/>
+          </a:lnRef>
+          <a:fillRef idx="0">
+            <a:schemeClr val="accent3"/>
+          </a:fillRef>
+          <a:effectRef idx="1">
+            <a:schemeClr val="accent3"/>
+          </a:effectRef>
+          <a:fontRef idx="minor">
+            <a:schemeClr val="tx1"/>
+          </a:fontRef>
+        </p:style>
+      </p:cxnSp>
+      <p:cxnSp>
+        <p:nvCxnSpPr>
+          <p:cNvPr id="31" name="Straight Connector 30"/>
+          <p:cNvCxnSpPr/>
+          <p:nvPr/>
+        </p:nvCxnSpPr>
+        <p:spPr>
+          <a:xfrm>
+            <a:off x="8123650" y="4259803"/>
+            <a:ext cx="0" cy="494872"/>
+          </a:xfrm>
+          <a:prstGeom prst="line">
+            <a:avLst/>
+          </a:prstGeom>
+        </p:spPr>
+        <p:style>
+          <a:lnRef idx="2">
+            <a:schemeClr val="accent3"/>
+          </a:lnRef>
+          <a:fillRef idx="0">
+            <a:schemeClr val="accent3"/>
+          </a:fillRef>
+          <a:effectRef idx="1">
+            <a:schemeClr val="accent3"/>
+          </a:effectRef>
+          <a:fontRef idx="minor">
+            <a:schemeClr val="tx1"/>
+          </a:fontRef>
+        </p:style>
+      </p:cxnSp>
+      <p:sp>
+        <p:nvSpPr>
+          <p:cNvPr id="32" name="TextBox 31"/>
+          <p:cNvSpPr txBox="1"/>
+          <p:nvPr/>
+        </p:nvSpPr>
+        <p:spPr>
+          <a:xfrm>
+            <a:off x="4283537" y="4899657"/>
+            <a:ext cx="3968943" cy="369332"/>
+          </a:xfrm>
+          <a:prstGeom prst="rect">
+            <a:avLst/>
+          </a:prstGeom>
+          <a:noFill/>
+        </p:spPr>
+        <p:txBody>
+          <a:bodyPr wrap="none" rtlCol="0">
+            <a:spAutoFit/>
+          </a:bodyPr>
+          <a:lstStyle/>
+          <a:p>
+            <a:r>
+              <a:rPr lang="en-US" dirty="0" smtClean="0"/>
+              <a:t>| 128 kb | 128 kb | 128 kb | … | 128 kb|</a:t>
+            </a:r>
+            <a:endParaRPr lang="en-US" dirty="0"/>
+          </a:p>
+        </p:txBody>
+      </p:sp>
+      <p:sp>
+        <p:nvSpPr>
+          <p:cNvPr id="3" name="TextBox 2"/>
+          <p:cNvSpPr txBox="1"/>
+          <p:nvPr/>
+        </p:nvSpPr>
+        <p:spPr>
+          <a:xfrm>
+            <a:off x="4283537" y="1792517"/>
+            <a:ext cx="1000582" cy="369332"/>
+          </a:xfrm>
+          <a:prstGeom prst="rect">
+            <a:avLst/>
+          </a:prstGeom>
+          <a:noFill/>
+        </p:spPr>
+        <p:txBody>
+          <a:bodyPr wrap="none" rtlCol="0">
+            <a:spAutoFit/>
+          </a:bodyPr>
+          <a:lstStyle/>
+          <a:p>
+            <a:r>
+              <a:rPr lang="en-US" b="1" dirty="0" smtClean="0"/>
+              <a:t>Peer List</a:t>
+            </a:r>
+            <a:endParaRPr lang="en-US" b="1" dirty="0"/>
+          </a:p>
+        </p:txBody>
+      </p:sp>
+      <p:sp>
+        <p:nvSpPr>
+          <p:cNvPr id="33" name="TextBox 32"/>
+          <p:cNvSpPr txBox="1"/>
+          <p:nvPr/>
+        </p:nvSpPr>
+        <p:spPr>
+          <a:xfrm>
+            <a:off x="4279769" y="3849307"/>
+            <a:ext cx="954934" cy="369332"/>
+          </a:xfrm>
+          <a:prstGeom prst="rect">
+            <a:avLst/>
+          </a:prstGeom>
+          <a:noFill/>
+        </p:spPr>
+        <p:txBody>
+          <a:bodyPr wrap="none" rtlCol="0">
+            <a:spAutoFit/>
+          </a:bodyPr>
+          <a:lstStyle/>
+          <a:p>
+            <a:r>
+              <a:rPr lang="en-US" b="1" dirty="0" smtClean="0"/>
+              <a:t>Content</a:t>
+            </a:r>
+            <a:endParaRPr lang="en-US" b="1" dirty="0"/>
+          </a:p>
+        </p:txBody>
+      </p:sp>
     </p:spTree>
     <p:extLst>
       <p:ext uri="{BB962C8B-B14F-4D97-AF65-F5344CB8AC3E}">
-        <p14:creationId xmlns:p14="http://schemas.microsoft.com/office/powerpoint/2010/main" val="1698869711"/>
+        <p14:creationId xmlns:p14="http://schemas.microsoft.com/office/powerpoint/2010/main" val="886899360"/>
       </p:ext>
     </p:extLst>
   </p:cSld>

</xml_diff>